<commit_message>
Oops Signed-off-by: Alexandre Lefoulon <alexandre.lefoulon@insa-lyon.fr>
</commit_message>
<xml_diff>
--- a/presentationLG.pptx
+++ b/presentationLG.pptx
@@ -4260,8 +4260,8 @@
         </p:nvSpPr>
         <p:spPr>
           <a:xfrm>
-            <a:off x="0" y="5080511"/>
-            <a:ext cx="9144000" cy="1477328"/>
+            <a:off x="0" y="4748408"/>
+            <a:ext cx="9144000" cy="1754327"/>
           </a:xfrm>
           <a:prstGeom prst="rect">
             <a:avLst/>
@@ -4296,6 +4296,14 @@
             <a:r>
               <a:rPr lang="fr-FR" dirty="0" err="1" smtClean="0"/>
               <a:t>Keromnes</a:t>
+            </a:r>
+            <a:endParaRPr lang="fr-FR" dirty="0" smtClean="0"/>
+          </a:p>
+          <a:p>
+            <a:pPr algn="ctr"/>
+            <a:r>
+              <a:rPr lang="fr-FR" dirty="0" smtClean="0"/>
+              <a:t>Alexandre Lefoulon</a:t>
             </a:r>
             <a:endParaRPr lang="fr-FR" dirty="0" smtClean="0"/>
           </a:p>
@@ -4812,13 +4820,8 @@
           <a:p>
             <a:r>
               <a:rPr lang="fr-FR" dirty="0" smtClean="0"/>
-              <a:t>Tests </a:t>
-            </a:r>
-            <a:r>
-              <a:rPr lang="fr-FR" dirty="0" smtClean="0"/>
-              <a:t>unitaires indépendants</a:t>
-            </a:r>
-            <a:endParaRPr lang="fr-FR" dirty="0" smtClean="0"/>
+              <a:t>Tests unitaires indépendants</a:t>
+            </a:r>
           </a:p>
           <a:p>
             <a:r>
@@ -4946,11 +4949,7 @@
           <a:p>
             <a:r>
               <a:rPr lang="fr-FR" dirty="0" smtClean="0"/>
-              <a:t>Processeur de flux </a:t>
-            </a:r>
-            <a:r>
-              <a:rPr lang="fr-FR" dirty="0" smtClean="0"/>
-              <a:t>XML :</a:t>
+              <a:t>Processeur de flux XML :</a:t>
             </a:r>
             <a:br>
               <a:rPr lang="fr-FR" dirty="0" smtClean="0"/>
@@ -4991,15 +4990,6 @@
               </a:rPr>
               <a:t> &lt; rap1.xml</a:t>
             </a:r>
-            <a:endParaRPr lang="fr-FR" dirty="0" smtClean="0">
-              <a:solidFill>
-                <a:schemeClr val="bg1">
-                  <a:lumMod val="65000"/>
-                </a:schemeClr>
-              </a:solidFill>
-              <a:latin typeface="Consolas"/>
-              <a:cs typeface="Consolas"/>
-            </a:endParaRPr>
           </a:p>
           <a:p>
             <a:r>
@@ -5037,47 +5027,7 @@
                 <a:latin typeface="Consolas"/>
                 <a:cs typeface="Consolas"/>
               </a:rPr>
-              <a:t> -v </a:t>
-            </a:r>
-            <a:r>
-              <a:rPr lang="fr-FR" dirty="0" smtClean="0">
-                <a:solidFill>
-                  <a:srgbClr val="A6A6A6"/>
-                </a:solidFill>
-                <a:latin typeface="Consolas"/>
-                <a:cs typeface="Consolas"/>
-              </a:rPr>
-              <a:t>-</a:t>
-            </a:r>
-            <a:r>
-              <a:rPr lang="fr-FR" dirty="0" smtClean="0">
-                <a:solidFill>
-                  <a:srgbClr val="A6A6A6"/>
-                </a:solidFill>
-                <a:latin typeface="Consolas"/>
-                <a:cs typeface="Consolas"/>
-              </a:rPr>
-              <a:t>d </a:t>
-            </a:r>
-            <a:r>
-              <a:rPr lang="fr-FR" dirty="0" smtClean="0">
-                <a:solidFill>
-                  <a:srgbClr val="A6A6A6"/>
-                </a:solidFill>
-                <a:latin typeface="Consolas"/>
-                <a:cs typeface="Consolas"/>
-              </a:rPr>
-              <a:t>-</a:t>
-            </a:r>
-            <a:r>
-              <a:rPr lang="fr-FR" dirty="0" smtClean="0">
-                <a:solidFill>
-                  <a:srgbClr val="A6A6A6"/>
-                </a:solidFill>
-                <a:latin typeface="Consolas"/>
-                <a:cs typeface="Consolas"/>
-              </a:rPr>
-              <a:t>s</a:t>
+              <a:t> -v -d -s</a:t>
             </a:r>
             <a:endParaRPr lang="fr-FR" dirty="0">
               <a:solidFill>
@@ -5204,11 +5154,7 @@
             </a:r>
             <a:r>
               <a:rPr lang="fr-FR" dirty="0" smtClean="0"/>
-              <a:t>++ </a:t>
-            </a:r>
-            <a:r>
-              <a:rPr lang="fr-FR" dirty="0" smtClean="0"/>
-              <a:t>et </a:t>
+              <a:t>++ et </a:t>
             </a:r>
             <a:r>
               <a:rPr lang="fr-FR" dirty="0" err="1" smtClean="0"/>
@@ -5234,11 +5180,7 @@
           <a:p>
             <a:r>
               <a:rPr lang="fr-FR" dirty="0" smtClean="0"/>
-              <a:t>Git </a:t>
-            </a:r>
-            <a:r>
-              <a:rPr lang="fr-FR" dirty="0" smtClean="0"/>
-              <a:t>et </a:t>
+              <a:t>Git et </a:t>
             </a:r>
             <a:r>
               <a:rPr lang="fr-FR" dirty="0" err="1" smtClean="0"/>

</xml_diff>